<commit_message>
Add react profiling + cleanup
</commit_message>
<xml_diff>
--- a/part-2/React-Perfo.pptx
+++ b/part-2/React-Perfo.pptx
@@ -213,7 +213,7 @@
           <a:p>
             <a:fld id="{DAFD8366-78F6-4B3C-B44B-186B48A03637}" type="datetimeFigureOut">
               <a:rPr lang="en-CA" smtClean="0"/>
-              <a:t>08/02/2019</a:t>
+              <a:t>2019-02-09</a:t>
             </a:fld>
             <a:endParaRPr lang="en-CA"/>
           </a:p>
@@ -918,7 +918,7 @@
           <a:p>
             <a:fld id="{F752A3F4-2F0B-4EDF-BB25-F54BA930C80F}" type="datetimeFigureOut">
               <a:rPr lang="en-CA" smtClean="0"/>
-              <a:t>08/02/2019</a:t>
+              <a:t>2019-02-09</a:t>
             </a:fld>
             <a:endParaRPr lang="en-CA"/>
           </a:p>
@@ -1118,7 +1118,7 @@
           <a:p>
             <a:fld id="{F752A3F4-2F0B-4EDF-BB25-F54BA930C80F}" type="datetimeFigureOut">
               <a:rPr lang="en-CA" smtClean="0"/>
-              <a:t>08/02/2019</a:t>
+              <a:t>2019-02-09</a:t>
             </a:fld>
             <a:endParaRPr lang="en-CA"/>
           </a:p>
@@ -1328,7 +1328,7 @@
           <a:p>
             <a:fld id="{F752A3F4-2F0B-4EDF-BB25-F54BA930C80F}" type="datetimeFigureOut">
               <a:rPr lang="en-CA" smtClean="0"/>
-              <a:t>08/02/2019</a:t>
+              <a:t>2019-02-09</a:t>
             </a:fld>
             <a:endParaRPr lang="en-CA"/>
           </a:p>
@@ -1528,7 +1528,7 @@
           <a:p>
             <a:fld id="{F752A3F4-2F0B-4EDF-BB25-F54BA930C80F}" type="datetimeFigureOut">
               <a:rPr lang="en-CA" smtClean="0"/>
-              <a:t>08/02/2019</a:t>
+              <a:t>2019-02-09</a:t>
             </a:fld>
             <a:endParaRPr lang="en-CA"/>
           </a:p>
@@ -1804,7 +1804,7 @@
           <a:p>
             <a:fld id="{F752A3F4-2F0B-4EDF-BB25-F54BA930C80F}" type="datetimeFigureOut">
               <a:rPr lang="en-CA" smtClean="0"/>
-              <a:t>08/02/2019</a:t>
+              <a:t>2019-02-09</a:t>
             </a:fld>
             <a:endParaRPr lang="en-CA"/>
           </a:p>
@@ -2072,7 +2072,7 @@
           <a:p>
             <a:fld id="{F752A3F4-2F0B-4EDF-BB25-F54BA930C80F}" type="datetimeFigureOut">
               <a:rPr lang="en-CA" smtClean="0"/>
-              <a:t>08/02/2019</a:t>
+              <a:t>2019-02-09</a:t>
             </a:fld>
             <a:endParaRPr lang="en-CA"/>
           </a:p>
@@ -2487,7 +2487,7 @@
           <a:p>
             <a:fld id="{F752A3F4-2F0B-4EDF-BB25-F54BA930C80F}" type="datetimeFigureOut">
               <a:rPr lang="en-CA" smtClean="0"/>
-              <a:t>08/02/2019</a:t>
+              <a:t>2019-02-09</a:t>
             </a:fld>
             <a:endParaRPr lang="en-CA"/>
           </a:p>
@@ -2629,7 +2629,7 @@
           <a:p>
             <a:fld id="{F752A3F4-2F0B-4EDF-BB25-F54BA930C80F}" type="datetimeFigureOut">
               <a:rPr lang="en-CA" smtClean="0"/>
-              <a:t>08/02/2019</a:t>
+              <a:t>2019-02-09</a:t>
             </a:fld>
             <a:endParaRPr lang="en-CA"/>
           </a:p>
@@ -2742,7 +2742,7 @@
           <a:p>
             <a:fld id="{F752A3F4-2F0B-4EDF-BB25-F54BA930C80F}" type="datetimeFigureOut">
               <a:rPr lang="en-CA" smtClean="0"/>
-              <a:t>08/02/2019</a:t>
+              <a:t>2019-02-09</a:t>
             </a:fld>
             <a:endParaRPr lang="en-CA"/>
           </a:p>
@@ -3055,7 +3055,7 @@
           <a:p>
             <a:fld id="{F752A3F4-2F0B-4EDF-BB25-F54BA930C80F}" type="datetimeFigureOut">
               <a:rPr lang="en-CA" smtClean="0"/>
-              <a:t>08/02/2019</a:t>
+              <a:t>2019-02-09</a:t>
             </a:fld>
             <a:endParaRPr lang="en-CA"/>
           </a:p>
@@ -3344,7 +3344,7 @@
           <a:p>
             <a:fld id="{F752A3F4-2F0B-4EDF-BB25-F54BA930C80F}" type="datetimeFigureOut">
               <a:rPr lang="en-CA" smtClean="0"/>
-              <a:t>08/02/2019</a:t>
+              <a:t>2019-02-09</a:t>
             </a:fld>
             <a:endParaRPr lang="en-CA"/>
           </a:p>
@@ -3587,7 +3587,7 @@
           <a:p>
             <a:fld id="{F752A3F4-2F0B-4EDF-BB25-F54BA930C80F}" type="datetimeFigureOut">
               <a:rPr lang="en-CA" smtClean="0"/>
-              <a:t>08/02/2019</a:t>
+              <a:t>2019-02-09</a:t>
             </a:fld>
             <a:endParaRPr lang="en-CA"/>
           </a:p>
@@ -5812,7 +5812,14 @@
           <a:bodyPr/>
           <a:lstStyle/>
           <a:p>
-            <a:endParaRPr lang="fr-CA"/>
+            <a:r>
+              <a:rPr lang="fr-CA" dirty="0" err="1"/>
+              <a:t>React</a:t>
+            </a:r>
+            <a:r>
+              <a:rPr lang="fr-CA" dirty="0"/>
+              <a:t> Profiler</a:t>
+            </a:r>
           </a:p>
         </p:txBody>
       </p:sp>
@@ -5837,7 +5844,21 @@
           <a:bodyPr/>
           <a:lstStyle/>
           <a:p>
-            <a:endParaRPr lang="fr-CA"/>
+            <a:r>
+              <a:rPr lang="fr-CA" dirty="0"/>
+              <a:t>Comprendre commit + </a:t>
+            </a:r>
+            <a:r>
+              <a:rPr lang="fr-CA" dirty="0" err="1"/>
+              <a:t>render</a:t>
+            </a:r>
+            <a:endParaRPr lang="fr-CA" dirty="0"/>
+          </a:p>
+          <a:p>
+            <a:r>
+              <a:rPr lang="fr-CA" dirty="0"/>
+              <a:t>Fixer les problèmes de performances</a:t>
+            </a:r>
           </a:p>
         </p:txBody>
       </p:sp>

</xml_diff>